<commit_message>
Added some of my stuff to pp
</commit_message>
<xml_diff>
--- a/eindpresentatie/Project56PresentationFinal.pptx
+++ b/eindpresentatie/Project56PresentationFinal.pptx
@@ -5,7 +5,7 @@
     <p:sldMasterId id="2147483762" r:id="rId1"/>
   </p:sldMasterIdLst>
   <p:notesMasterIdLst>
-    <p:notesMasterId r:id="rId25"/>
+    <p:notesMasterId r:id="rId26"/>
   </p:notesMasterIdLst>
   <p:sldIdLst>
     <p:sldId id="262" r:id="rId2"/>
@@ -29,8 +29,9 @@
     <p:sldId id="277" r:id="rId20"/>
     <p:sldId id="278" r:id="rId21"/>
     <p:sldId id="279" r:id="rId22"/>
-    <p:sldId id="280" r:id="rId23"/>
-    <p:sldId id="281" r:id="rId24"/>
+    <p:sldId id="282" r:id="rId23"/>
+    <p:sldId id="280" r:id="rId24"/>
+    <p:sldId id="281" r:id="rId25"/>
   </p:sldIdLst>
   <p:sldSz cx="12192000" cy="6858000"/>
   <p:notesSz cx="6858000" cy="9144000"/>
@@ -219,7 +220,7 @@
           <a:p>
             <a:fld id="{3717E5AF-2560-40B9-B637-3F22ADAA11BF}" type="datetimeFigureOut">
               <a:rPr lang="nl-NL"/>
-              <a:t>26-1-2016</a:t>
+              <a:t>27-1-2016</a:t>
             </a:fld>
             <a:endParaRPr lang="nl-NL"/>
           </a:p>
@@ -1727,7 +1728,7 @@
           <a:p>
             <a:fld id="{6E886DD0-1B50-4D20-8B18-3D1C620880A6}" type="slidenum">
               <a:rPr lang="nl-NL"/>
-              <a:t>22</a:t>
+              <a:t>23</a:t>
             </a:fld>
             <a:endParaRPr lang="nl-NL"/>
           </a:p>
@@ -1811,7 +1812,7 @@
           <a:p>
             <a:fld id="{6E886DD0-1B50-4D20-8B18-3D1C620880A6}" type="slidenum">
               <a:rPr lang="nl-NL"/>
-              <a:t>23</a:t>
+              <a:t>24</a:t>
             </a:fld>
             <a:endParaRPr lang="nl-NL"/>
           </a:p>
@@ -2604,7 +2605,7 @@
           <a:p>
             <a:fld id="{CA953BDC-9EAE-49FE-9892-958C9F845175}" type="datetimeFigureOut">
               <a:rPr lang="de-DE" smtClean="0"/>
-              <a:t>26.01.2016</a:t>
+              <a:t>27.01.2016</a:t>
             </a:fld>
             <a:endParaRPr lang="de-DE"/>
           </a:p>
@@ -2879,7 +2880,7 @@
           <a:p>
             <a:fld id="{CA953BDC-9EAE-49FE-9892-958C9F845175}" type="datetimeFigureOut">
               <a:rPr lang="de-DE" smtClean="0"/>
-              <a:t>26.01.2016</a:t>
+              <a:t>27.01.2016</a:t>
             </a:fld>
             <a:endParaRPr lang="de-DE"/>
           </a:p>
@@ -3073,7 +3074,7 @@
           <a:p>
             <a:fld id="{CA953BDC-9EAE-49FE-9892-958C9F845175}" type="datetimeFigureOut">
               <a:rPr lang="de-DE" smtClean="0"/>
-              <a:t>26.01.2016</a:t>
+              <a:t>27.01.2016</a:t>
             </a:fld>
             <a:endParaRPr lang="de-DE"/>
           </a:p>
@@ -3346,7 +3347,7 @@
           <a:p>
             <a:fld id="{CA953BDC-9EAE-49FE-9892-958C9F845175}" type="datetimeFigureOut">
               <a:rPr lang="de-DE" smtClean="0"/>
-              <a:t>26.01.2016</a:t>
+              <a:t>27.01.2016</a:t>
             </a:fld>
             <a:endParaRPr lang="de-DE"/>
           </a:p>
@@ -3687,7 +3688,7 @@
           <a:p>
             <a:fld id="{CA953BDC-9EAE-49FE-9892-958C9F845175}" type="datetimeFigureOut">
               <a:rPr lang="de-DE" smtClean="0"/>
-              <a:t>26.01.2016</a:t>
+              <a:t>27.01.2016</a:t>
             </a:fld>
             <a:endParaRPr lang="de-DE"/>
           </a:p>
@@ -4310,7 +4311,7 @@
           <a:p>
             <a:fld id="{CA953BDC-9EAE-49FE-9892-958C9F845175}" type="datetimeFigureOut">
               <a:rPr lang="de-DE" smtClean="0"/>
-              <a:t>26.01.2016</a:t>
+              <a:t>27.01.2016</a:t>
             </a:fld>
             <a:endParaRPr lang="de-DE"/>
           </a:p>
@@ -5170,7 +5171,7 @@
           <a:p>
             <a:fld id="{CA953BDC-9EAE-49FE-9892-958C9F845175}" type="datetimeFigureOut">
               <a:rPr lang="de-DE" smtClean="0"/>
-              <a:t>26.01.2016</a:t>
+              <a:t>27.01.2016</a:t>
             </a:fld>
             <a:endParaRPr lang="de-DE"/>
           </a:p>
@@ -5340,7 +5341,7 @@
           <a:p>
             <a:fld id="{CA953BDC-9EAE-49FE-9892-958C9F845175}" type="datetimeFigureOut">
               <a:rPr lang="de-DE" smtClean="0"/>
-              <a:t>26.01.2016</a:t>
+              <a:t>27.01.2016</a:t>
             </a:fld>
             <a:endParaRPr lang="de-DE"/>
           </a:p>
@@ -5520,7 +5521,7 @@
           <a:p>
             <a:fld id="{CA953BDC-9EAE-49FE-9892-958C9F845175}" type="datetimeFigureOut">
               <a:rPr lang="de-DE" smtClean="0"/>
-              <a:t>26.01.2016</a:t>
+              <a:t>27.01.2016</a:t>
             </a:fld>
             <a:endParaRPr lang="de-DE"/>
           </a:p>
@@ -5690,7 +5691,7 @@
           <a:p>
             <a:fld id="{CA953BDC-9EAE-49FE-9892-958C9F845175}" type="datetimeFigureOut">
               <a:rPr lang="de-DE" smtClean="0"/>
-              <a:t>26.01.2016</a:t>
+              <a:t>27.01.2016</a:t>
             </a:fld>
             <a:endParaRPr lang="de-DE"/>
           </a:p>
@@ -5937,7 +5938,7 @@
           <a:p>
             <a:fld id="{CA953BDC-9EAE-49FE-9892-958C9F845175}" type="datetimeFigureOut">
               <a:rPr lang="de-DE" smtClean="0"/>
-              <a:t>26.01.2016</a:t>
+              <a:t>27.01.2016</a:t>
             </a:fld>
             <a:endParaRPr lang="de-DE"/>
           </a:p>
@@ -6229,7 +6230,7 @@
           <a:p>
             <a:fld id="{CA953BDC-9EAE-49FE-9892-958C9F845175}" type="datetimeFigureOut">
               <a:rPr lang="de-DE" smtClean="0"/>
-              <a:t>26.01.2016</a:t>
+              <a:t>27.01.2016</a:t>
             </a:fld>
             <a:endParaRPr lang="de-DE"/>
           </a:p>
@@ -6673,7 +6674,7 @@
           <a:p>
             <a:fld id="{CA953BDC-9EAE-49FE-9892-958C9F845175}" type="datetimeFigureOut">
               <a:rPr lang="de-DE" smtClean="0"/>
-              <a:t>26.01.2016</a:t>
+              <a:t>27.01.2016</a:t>
             </a:fld>
             <a:endParaRPr lang="de-DE"/>
           </a:p>
@@ -6791,7 +6792,7 @@
           <a:p>
             <a:fld id="{CA953BDC-9EAE-49FE-9892-958C9F845175}" type="datetimeFigureOut">
               <a:rPr lang="de-DE" smtClean="0"/>
-              <a:t>26.01.2016</a:t>
+              <a:t>27.01.2016</a:t>
             </a:fld>
             <a:endParaRPr lang="de-DE"/>
           </a:p>
@@ -6886,7 +6887,7 @@
           <a:p>
             <a:fld id="{CA953BDC-9EAE-49FE-9892-958C9F845175}" type="datetimeFigureOut">
               <a:rPr lang="de-DE" smtClean="0"/>
-              <a:t>26.01.2016</a:t>
+              <a:t>27.01.2016</a:t>
             </a:fld>
             <a:endParaRPr lang="de-DE"/>
           </a:p>
@@ -7165,7 +7166,7 @@
           <a:p>
             <a:fld id="{CA953BDC-9EAE-49FE-9892-958C9F845175}" type="datetimeFigureOut">
               <a:rPr lang="de-DE" smtClean="0"/>
-              <a:t>26.01.2016</a:t>
+              <a:t>27.01.2016</a:t>
             </a:fld>
             <a:endParaRPr lang="de-DE"/>
           </a:p>
@@ -7440,7 +7441,7 @@
           <a:p>
             <a:fld id="{CA953BDC-9EAE-49FE-9892-958C9F845175}" type="datetimeFigureOut">
               <a:rPr lang="de-DE" smtClean="0"/>
-              <a:t>26.01.2016</a:t>
+              <a:t>27.01.2016</a:t>
             </a:fld>
             <a:endParaRPr lang="de-DE"/>
           </a:p>
@@ -7875,7 +7876,7 @@
           <a:p>
             <a:fld id="{CA953BDC-9EAE-49FE-9892-958C9F845175}" type="datetimeFigureOut">
               <a:rPr lang="de-DE" smtClean="0"/>
-              <a:t>26.01.2016</a:t>
+              <a:t>27.01.2016</a:t>
             </a:fld>
             <a:endParaRPr lang="de-DE"/>
           </a:p>
@@ -9661,17 +9662,15 @@
           <a:lstStyle/>
           <a:p>
             <a:r>
-              <a:rPr lang="nl-NL" sz="2800"/>
+              <a:rPr lang="nl-NL" sz="2800" dirty="0"/>
               <a:t>Large PHP5 Framework</a:t>
             </a:r>
-            <a:endParaRPr lang="nl-NL" sz="2800" dirty="0"/>
-          </a:p>
-          <a:p>
-            <a:r>
-              <a:rPr lang="nl-NL" sz="2800"/>
+          </a:p>
+          <a:p>
+            <a:r>
+              <a:rPr lang="nl-NL" sz="2800" dirty="0"/>
               <a:t>MVC (Model-View-Controller)</a:t>
             </a:r>
-            <a:endParaRPr lang="nl-NL" sz="2800" dirty="0"/>
           </a:p>
           <a:p>
             <a:endParaRPr lang="nl-NL" sz="2800" dirty="0">
@@ -9694,6 +9693,47 @@
           </a:p>
         </p:txBody>
       </p:sp>
+      <p:pic>
+        <p:nvPicPr>
+          <p:cNvPr id="1030" name="Picture 6" descr="http://futureprofilez.com/wp-content/uploads/2014/07/laravel.png"/>
+          <p:cNvPicPr>
+            <a:picLocks noChangeAspect="1" noChangeArrowheads="1"/>
+          </p:cNvPicPr>
+          <p:nvPr/>
+        </p:nvPicPr>
+        <p:blipFill>
+          <a:blip r:embed="rId3">
+            <a:extLst>
+              <a:ext uri="{28A0092B-C50C-407E-A947-70E740481C1C}">
+                <a14:useLocalDpi xmlns:a14="http://schemas.microsoft.com/office/drawing/2010/main" val="0"/>
+              </a:ext>
+            </a:extLst>
+          </a:blip>
+          <a:srcRect/>
+          <a:stretch>
+            <a:fillRect/>
+          </a:stretch>
+        </p:blipFill>
+        <p:spPr bwMode="auto">
+          <a:xfrm>
+            <a:off x="7446079" y="2420697"/>
+            <a:ext cx="3277673" cy="3277673"/>
+          </a:xfrm>
+          <a:prstGeom prst="rect">
+            <a:avLst/>
+          </a:prstGeom>
+          <a:noFill/>
+          <a:extLst>
+            <a:ext uri="{909E8E84-426E-40DD-AFC4-6F175D3DCCD1}">
+              <a14:hiddenFill xmlns:a14="http://schemas.microsoft.com/office/drawing/2010/main">
+                <a:solidFill>
+                  <a:srgbClr val="FFFFFF"/>
+                </a:solidFill>
+              </a14:hiddenFill>
+            </a:ext>
+          </a:extLst>
+        </p:spPr>
+      </p:pic>
     </p:spTree>
     <p:extLst>
       <p:ext uri="{BB962C8B-B14F-4D97-AF65-F5344CB8AC3E}">
@@ -9892,7 +9932,7 @@
         </p:nvSpPr>
         <p:spPr>
           <a:xfrm>
-            <a:off x="1103313" y="1580155"/>
+            <a:off x="646113" y="1310425"/>
             <a:ext cx="10420350" cy="4958758"/>
           </a:xfrm>
         </p:spPr>
@@ -9903,24 +9943,161 @@
           <a:lstStyle/>
           <a:p>
             <a:r>
-              <a:rPr lang="nl-NL" sz="2800"/>
-              <a:t>Basically, give the user a smooth way to interact with our back-end!</a:t>
-            </a:r>
-            <a:endParaRPr lang="nl-NL" sz="2800" dirty="0"/>
-          </a:p>
-          <a:p>
-            <a:r>
-              <a:rPr lang="nl-NL" sz="2800"/>
-              <a:t>We used routers to configure the accesible URL's on our webpage,</a:t>
-            </a:r>
-            <a:endParaRPr lang="nl-NL" sz="2800" dirty="0"/>
-          </a:p>
-          <a:p>
-            <a:r>
-              <a:rPr lang="nl-NL" sz="2800"/>
-              <a:t>Models to define databases,</a:t>
-            </a:r>
-            <a:endParaRPr lang="nl-NL" sz="2800" dirty="0"/>
+              <a:rPr lang="nl-NL" sz="2800" dirty="0" err="1"/>
+              <a:t>Basically</a:t>
+            </a:r>
+            <a:r>
+              <a:rPr lang="nl-NL" sz="2800" dirty="0"/>
+              <a:t>, </a:t>
+            </a:r>
+            <a:r>
+              <a:rPr lang="nl-NL" sz="2800" dirty="0" err="1"/>
+              <a:t>give</a:t>
+            </a:r>
+            <a:r>
+              <a:rPr lang="nl-NL" sz="2800" dirty="0"/>
+              <a:t> </a:t>
+            </a:r>
+            <a:r>
+              <a:rPr lang="nl-NL" sz="2800" dirty="0" err="1"/>
+              <a:t>the</a:t>
+            </a:r>
+            <a:r>
+              <a:rPr lang="nl-NL" sz="2800" dirty="0"/>
+              <a:t> user a </a:t>
+            </a:r>
+            <a:r>
+              <a:rPr lang="nl-NL" sz="2800" dirty="0" err="1"/>
+              <a:t>smooth</a:t>
+            </a:r>
+            <a:r>
+              <a:rPr lang="nl-NL" sz="2800" dirty="0"/>
+              <a:t> way </a:t>
+            </a:r>
+            <a:r>
+              <a:rPr lang="nl-NL" sz="2800" dirty="0" err="1"/>
+              <a:t>to</a:t>
+            </a:r>
+            <a:r>
+              <a:rPr lang="nl-NL" sz="2800" dirty="0"/>
+              <a:t> </a:t>
+            </a:r>
+            <a:r>
+              <a:rPr lang="nl-NL" sz="2800" dirty="0" err="1"/>
+              <a:t>interact</a:t>
+            </a:r>
+            <a:r>
+              <a:rPr lang="nl-NL" sz="2800" dirty="0"/>
+              <a:t> </a:t>
+            </a:r>
+            <a:r>
+              <a:rPr lang="nl-NL" sz="2800" dirty="0" err="1"/>
+              <a:t>with</a:t>
+            </a:r>
+            <a:r>
+              <a:rPr lang="nl-NL" sz="2800" dirty="0"/>
+              <a:t> </a:t>
+            </a:r>
+            <a:r>
+              <a:rPr lang="nl-NL" sz="2800" dirty="0" err="1"/>
+              <a:t>our</a:t>
+            </a:r>
+            <a:r>
+              <a:rPr lang="nl-NL" sz="2800" dirty="0"/>
+              <a:t> </a:t>
+            </a:r>
+            <a:r>
+              <a:rPr lang="nl-NL" sz="2800" dirty="0" err="1"/>
+              <a:t>back-end</a:t>
+            </a:r>
+            <a:r>
+              <a:rPr lang="nl-NL" sz="2800" dirty="0"/>
+              <a:t>!</a:t>
+            </a:r>
+          </a:p>
+          <a:p>
+            <a:r>
+              <a:rPr lang="nl-NL" sz="2800" dirty="0"/>
+              <a:t>We </a:t>
+            </a:r>
+            <a:r>
+              <a:rPr lang="nl-NL" sz="2800" dirty="0" err="1"/>
+              <a:t>used</a:t>
+            </a:r>
+            <a:r>
+              <a:rPr lang="nl-NL" sz="2800" dirty="0"/>
+              <a:t> </a:t>
+            </a:r>
+            <a:r>
+              <a:rPr lang="nl-NL" sz="2800" dirty="0" smtClean="0"/>
+              <a:t>routes </a:t>
+            </a:r>
+            <a:r>
+              <a:rPr lang="nl-NL" sz="2800" dirty="0" err="1"/>
+              <a:t>to</a:t>
+            </a:r>
+            <a:r>
+              <a:rPr lang="nl-NL" sz="2800" dirty="0"/>
+              <a:t> </a:t>
+            </a:r>
+            <a:r>
+              <a:rPr lang="nl-NL" sz="2800" dirty="0" err="1"/>
+              <a:t>configure</a:t>
+            </a:r>
+            <a:r>
+              <a:rPr lang="nl-NL" sz="2800" dirty="0"/>
+              <a:t> </a:t>
+            </a:r>
+            <a:r>
+              <a:rPr lang="nl-NL" sz="2800" dirty="0" err="1"/>
+              <a:t>the</a:t>
+            </a:r>
+            <a:r>
+              <a:rPr lang="nl-NL" sz="2800" dirty="0"/>
+              <a:t> </a:t>
+            </a:r>
+            <a:r>
+              <a:rPr lang="nl-NL" sz="2800" dirty="0" err="1"/>
+              <a:t>accesible</a:t>
+            </a:r>
+            <a:r>
+              <a:rPr lang="nl-NL" sz="2800" dirty="0"/>
+              <a:t> URL's on </a:t>
+            </a:r>
+            <a:r>
+              <a:rPr lang="nl-NL" sz="2800" dirty="0" err="1"/>
+              <a:t>our</a:t>
+            </a:r>
+            <a:r>
+              <a:rPr lang="nl-NL" sz="2800" dirty="0"/>
+              <a:t> webpage,</a:t>
+            </a:r>
+          </a:p>
+          <a:p>
+            <a:r>
+              <a:rPr lang="nl-NL" sz="2800" dirty="0" err="1"/>
+              <a:t>Models</a:t>
+            </a:r>
+            <a:r>
+              <a:rPr lang="nl-NL" sz="2800" dirty="0"/>
+              <a:t> </a:t>
+            </a:r>
+            <a:r>
+              <a:rPr lang="nl-NL" sz="2800" dirty="0" err="1"/>
+              <a:t>to</a:t>
+            </a:r>
+            <a:r>
+              <a:rPr lang="nl-NL" sz="2800" dirty="0"/>
+              <a:t> </a:t>
+            </a:r>
+            <a:r>
+              <a:rPr lang="nl-NL" sz="2800" dirty="0" err="1"/>
+              <a:t>define</a:t>
+            </a:r>
+            <a:r>
+              <a:rPr lang="nl-NL" sz="2800" dirty="0"/>
+              <a:t> databases,</a:t>
+            </a:r>
           </a:p>
           <a:p>
             <a:r>
@@ -9943,6 +10120,829 @@
               <a:buNone/>
             </a:pPr>
             <a:endParaRPr lang="nl-NL" dirty="0"/>
+          </a:p>
+        </p:txBody>
+      </p:sp>
+      <p:sp>
+        <p:nvSpPr>
+          <p:cNvPr id="5" name="Rectangle 2"/>
+          <p:cNvSpPr>
+            <a:spLocks noChangeArrowheads="1"/>
+          </p:cNvSpPr>
+          <p:nvPr/>
+        </p:nvSpPr>
+        <p:spPr bwMode="auto">
+          <a:xfrm>
+            <a:off x="0" y="4610637"/>
+            <a:ext cx="12192000" cy="457200"/>
+          </a:xfrm>
+          <a:prstGeom prst="rect">
+            <a:avLst/>
+          </a:prstGeom>
+          <a:solidFill>
+            <a:srgbClr val="FFFFFF"/>
+          </a:solidFill>
+          <a:ln>
+            <a:noFill/>
+          </a:ln>
+          <a:effectLst/>
+          <a:extLst>
+            <a:ext uri="{91240B29-F687-4F45-9708-019B960494DF}">
+              <a14:hiddenLine xmlns:a14="http://schemas.microsoft.com/office/drawing/2010/main" w="9525">
+                <a:solidFill>
+                  <a:schemeClr val="tx1"/>
+                </a:solidFill>
+                <a:miter lim="800000"/>
+                <a:headEnd/>
+                <a:tailEnd/>
+              </a14:hiddenLine>
+            </a:ext>
+            <a:ext uri="{AF507438-7753-43E0-B8FC-AC1667EBCBE1}">
+              <a14:hiddenEffects xmlns:a14="http://schemas.microsoft.com/office/drawing/2010/main">
+                <a:effectLst>
+                  <a:outerShdw dist="35921" dir="2700000" algn="ctr" rotWithShape="0">
+                    <a:schemeClr val="bg2"/>
+                  </a:outerShdw>
+                </a:effectLst>
+              </a14:hiddenEffects>
+            </a:ext>
+          </a:extLst>
+        </p:spPr>
+        <p:txBody>
+          <a:bodyPr vert="horz" wrap="none" lIns="91440" tIns="45720" rIns="91440" bIns="45720" numCol="1" anchor="ctr" anchorCtr="0" compatLnSpc="1">
+            <a:prstTxWarp prst="textNoShape">
+              <a:avLst/>
+            </a:prstTxWarp>
+            <a:spAutoFit/>
+          </a:bodyPr>
+          <a:lstStyle/>
+          <a:p>
+            <a:pPr marL="0" marR="0" lvl="0" indent="0" algn="l" defTabSz="914400" rtl="0" eaLnBrk="0" fontAlgn="base" latinLnBrk="0" hangingPunct="0">
+              <a:lnSpc>
+                <a:spcPct val="100000"/>
+              </a:lnSpc>
+              <a:spcBef>
+                <a:spcPct val="0"/>
+              </a:spcBef>
+              <a:spcAft>
+                <a:spcPct val="0"/>
+              </a:spcAft>
+              <a:buClrTx/>
+              <a:buSzTx/>
+              <a:buFontTx/>
+              <a:buNone/>
+              <a:tabLst/>
+            </a:pPr>
+            <a:r>
+              <a:rPr kumimoji="0" lang="nl-NL" altLang="nl-NL" sz="1000" b="0" i="0" u="none" strike="noStrike" cap="none" normalizeH="0" baseline="0" dirty="0" smtClean="0">
+                <a:ln>
+                  <a:noFill/>
+                </a:ln>
+                <a:solidFill>
+                  <a:srgbClr val="000000"/>
+                </a:solidFill>
+                <a:effectLst/>
+                <a:latin typeface="Courier New" panose="02070309020205020404" pitchFamily="49" charset="0"/>
+                <a:cs typeface="Courier New" panose="02070309020205020404" pitchFamily="49" charset="0"/>
+              </a:rPr>
+              <a:t>Route::get(</a:t>
+            </a:r>
+            <a:r>
+              <a:rPr kumimoji="0" lang="nl-NL" altLang="nl-NL" sz="1000" b="1" i="0" u="none" strike="noStrike" cap="none" normalizeH="0" baseline="0" dirty="0" smtClean="0">
+                <a:ln>
+                  <a:noFill/>
+                </a:ln>
+                <a:solidFill>
+                  <a:srgbClr val="008000"/>
+                </a:solidFill>
+                <a:effectLst/>
+                <a:latin typeface="Courier New" panose="02070309020205020404" pitchFamily="49" charset="0"/>
+                <a:cs typeface="Courier New" panose="02070309020205020404" pitchFamily="49" charset="0"/>
+              </a:rPr>
+              <a:t>'</a:t>
+            </a:r>
+            <a:r>
+              <a:rPr kumimoji="0" lang="nl-NL" altLang="nl-NL" sz="1000" b="1" i="0" u="none" strike="noStrike" cap="none" normalizeH="0" baseline="0" dirty="0" err="1" smtClean="0">
+                <a:ln>
+                  <a:noFill/>
+                </a:ln>
+                <a:solidFill>
+                  <a:srgbClr val="008000"/>
+                </a:solidFill>
+                <a:effectLst/>
+                <a:latin typeface="Courier New" panose="02070309020205020404" pitchFamily="49" charset="0"/>
+                <a:cs typeface="Courier New" panose="02070309020205020404" pitchFamily="49" charset="0"/>
+              </a:rPr>
+              <a:t>uploaded</a:t>
+            </a:r>
+            <a:r>
+              <a:rPr kumimoji="0" lang="nl-NL" altLang="nl-NL" sz="1000" b="1" i="0" u="none" strike="noStrike" cap="none" normalizeH="0" baseline="0" dirty="0" smtClean="0">
+                <a:ln>
+                  <a:noFill/>
+                </a:ln>
+                <a:solidFill>
+                  <a:srgbClr val="008000"/>
+                </a:solidFill>
+                <a:effectLst/>
+                <a:latin typeface="Courier New" panose="02070309020205020404" pitchFamily="49" charset="0"/>
+                <a:cs typeface="Courier New" panose="02070309020205020404" pitchFamily="49" charset="0"/>
+              </a:rPr>
+              <a:t>'</a:t>
+            </a:r>
+            <a:r>
+              <a:rPr kumimoji="0" lang="nl-NL" altLang="nl-NL" sz="1000" b="0" i="0" u="none" strike="noStrike" cap="none" normalizeH="0" baseline="0" dirty="0" smtClean="0">
+                <a:ln>
+                  <a:noFill/>
+                </a:ln>
+                <a:solidFill>
+                  <a:srgbClr val="000000"/>
+                </a:solidFill>
+                <a:effectLst/>
+                <a:latin typeface="Courier New" panose="02070309020205020404" pitchFamily="49" charset="0"/>
+                <a:cs typeface="Courier New" panose="02070309020205020404" pitchFamily="49" charset="0"/>
+              </a:rPr>
+              <a:t>, [</a:t>
+            </a:r>
+            <a:r>
+              <a:rPr kumimoji="0" lang="nl-NL" altLang="nl-NL" sz="1000" b="1" i="0" u="none" strike="noStrike" cap="none" normalizeH="0" baseline="0" dirty="0" smtClean="0">
+                <a:ln>
+                  <a:noFill/>
+                </a:ln>
+                <a:solidFill>
+                  <a:srgbClr val="008000"/>
+                </a:solidFill>
+                <a:effectLst/>
+                <a:latin typeface="Courier New" panose="02070309020205020404" pitchFamily="49" charset="0"/>
+                <a:cs typeface="Courier New" panose="02070309020205020404" pitchFamily="49" charset="0"/>
+              </a:rPr>
+              <a:t>'middleware' </a:t>
+            </a:r>
+            <a:r>
+              <a:rPr kumimoji="0" lang="nl-NL" altLang="nl-NL" sz="1000" b="0" i="0" u="none" strike="noStrike" cap="none" normalizeH="0" baseline="0" dirty="0" smtClean="0">
+                <a:ln>
+                  <a:noFill/>
+                </a:ln>
+                <a:solidFill>
+                  <a:srgbClr val="000000"/>
+                </a:solidFill>
+                <a:effectLst/>
+                <a:latin typeface="Courier New" panose="02070309020205020404" pitchFamily="49" charset="0"/>
+                <a:cs typeface="Courier New" panose="02070309020205020404" pitchFamily="49" charset="0"/>
+              </a:rPr>
+              <a:t>=&gt; </a:t>
+            </a:r>
+            <a:r>
+              <a:rPr kumimoji="0" lang="nl-NL" altLang="nl-NL" sz="1000" b="1" i="0" u="none" strike="noStrike" cap="none" normalizeH="0" baseline="0" dirty="0" smtClean="0">
+                <a:ln>
+                  <a:noFill/>
+                </a:ln>
+                <a:solidFill>
+                  <a:srgbClr val="008000"/>
+                </a:solidFill>
+                <a:effectLst/>
+                <a:latin typeface="Courier New" panose="02070309020205020404" pitchFamily="49" charset="0"/>
+                <a:cs typeface="Courier New" panose="02070309020205020404" pitchFamily="49" charset="0"/>
+              </a:rPr>
+              <a:t>'</a:t>
+            </a:r>
+            <a:r>
+              <a:rPr kumimoji="0" lang="nl-NL" altLang="nl-NL" sz="1000" b="1" i="0" u="none" strike="noStrike" cap="none" normalizeH="0" baseline="0" dirty="0" err="1" smtClean="0">
+                <a:ln>
+                  <a:noFill/>
+                </a:ln>
+                <a:solidFill>
+                  <a:srgbClr val="008000"/>
+                </a:solidFill>
+                <a:effectLst/>
+                <a:latin typeface="Courier New" panose="02070309020205020404" pitchFamily="49" charset="0"/>
+                <a:cs typeface="Courier New" panose="02070309020205020404" pitchFamily="49" charset="0"/>
+              </a:rPr>
+              <a:t>auth</a:t>
+            </a:r>
+            <a:r>
+              <a:rPr kumimoji="0" lang="nl-NL" altLang="nl-NL" sz="1000" b="1" i="0" u="none" strike="noStrike" cap="none" normalizeH="0" baseline="0" dirty="0" smtClean="0">
+                <a:ln>
+                  <a:noFill/>
+                </a:ln>
+                <a:solidFill>
+                  <a:srgbClr val="008000"/>
+                </a:solidFill>
+                <a:effectLst/>
+                <a:latin typeface="Courier New" panose="02070309020205020404" pitchFamily="49" charset="0"/>
+                <a:cs typeface="Courier New" panose="02070309020205020404" pitchFamily="49" charset="0"/>
+              </a:rPr>
+              <a:t>'</a:t>
+            </a:r>
+            <a:r>
+              <a:rPr kumimoji="0" lang="nl-NL" altLang="nl-NL" sz="1000" b="0" i="0" u="none" strike="noStrike" cap="none" normalizeH="0" baseline="0" dirty="0" smtClean="0">
+                <a:ln>
+                  <a:noFill/>
+                </a:ln>
+                <a:solidFill>
+                  <a:srgbClr val="000000"/>
+                </a:solidFill>
+                <a:effectLst/>
+                <a:latin typeface="Courier New" panose="02070309020205020404" pitchFamily="49" charset="0"/>
+                <a:cs typeface="Courier New" panose="02070309020205020404" pitchFamily="49" charset="0"/>
+              </a:rPr>
+              <a:t>, </a:t>
+            </a:r>
+            <a:r>
+              <a:rPr kumimoji="0" lang="nl-NL" altLang="nl-NL" sz="1000" b="1" i="0" u="none" strike="noStrike" cap="none" normalizeH="0" baseline="0" dirty="0" smtClean="0">
+                <a:ln>
+                  <a:noFill/>
+                </a:ln>
+                <a:solidFill>
+                  <a:srgbClr val="008000"/>
+                </a:solidFill>
+                <a:effectLst/>
+                <a:latin typeface="Courier New" panose="02070309020205020404" pitchFamily="49" charset="0"/>
+                <a:cs typeface="Courier New" panose="02070309020205020404" pitchFamily="49" charset="0"/>
+              </a:rPr>
+              <a:t>'</a:t>
+            </a:r>
+            <a:r>
+              <a:rPr kumimoji="0" lang="nl-NL" altLang="nl-NL" sz="1000" b="1" i="0" u="none" strike="noStrike" cap="none" normalizeH="0" baseline="0" dirty="0" err="1" smtClean="0">
+                <a:ln>
+                  <a:noFill/>
+                </a:ln>
+                <a:solidFill>
+                  <a:srgbClr val="008000"/>
+                </a:solidFill>
+                <a:effectLst/>
+                <a:latin typeface="Courier New" panose="02070309020205020404" pitchFamily="49" charset="0"/>
+                <a:cs typeface="Courier New" panose="02070309020205020404" pitchFamily="49" charset="0"/>
+              </a:rPr>
+              <a:t>uses</a:t>
+            </a:r>
+            <a:r>
+              <a:rPr kumimoji="0" lang="nl-NL" altLang="nl-NL" sz="1000" b="1" i="0" u="none" strike="noStrike" cap="none" normalizeH="0" baseline="0" dirty="0" smtClean="0">
+                <a:ln>
+                  <a:noFill/>
+                </a:ln>
+                <a:solidFill>
+                  <a:srgbClr val="008000"/>
+                </a:solidFill>
+                <a:effectLst/>
+                <a:latin typeface="Courier New" panose="02070309020205020404" pitchFamily="49" charset="0"/>
+                <a:cs typeface="Courier New" panose="02070309020205020404" pitchFamily="49" charset="0"/>
+              </a:rPr>
+              <a:t>' </a:t>
+            </a:r>
+            <a:r>
+              <a:rPr kumimoji="0" lang="nl-NL" altLang="nl-NL" sz="1000" b="0" i="0" u="none" strike="noStrike" cap="none" normalizeH="0" baseline="0" dirty="0" smtClean="0">
+                <a:ln>
+                  <a:noFill/>
+                </a:ln>
+                <a:solidFill>
+                  <a:srgbClr val="000000"/>
+                </a:solidFill>
+                <a:effectLst/>
+                <a:latin typeface="Courier New" panose="02070309020205020404" pitchFamily="49" charset="0"/>
+                <a:cs typeface="Courier New" panose="02070309020205020404" pitchFamily="49" charset="0"/>
+              </a:rPr>
+              <a:t>=&gt; </a:t>
+            </a:r>
+            <a:r>
+              <a:rPr kumimoji="0" lang="nl-NL" altLang="nl-NL" sz="1000" b="1" i="0" u="none" strike="noStrike" cap="none" normalizeH="0" baseline="0" dirty="0" smtClean="0">
+                <a:ln>
+                  <a:noFill/>
+                </a:ln>
+                <a:solidFill>
+                  <a:srgbClr val="008000"/>
+                </a:solidFill>
+                <a:effectLst/>
+                <a:latin typeface="Courier New" panose="02070309020205020404" pitchFamily="49" charset="0"/>
+                <a:cs typeface="Courier New" panose="02070309020205020404" pitchFamily="49" charset="0"/>
+              </a:rPr>
+              <a:t>'</a:t>
+            </a:r>
+            <a:r>
+              <a:rPr kumimoji="0" lang="nl-NL" altLang="nl-NL" sz="1000" b="1" i="0" u="none" strike="noStrike" cap="none" normalizeH="0" baseline="0" dirty="0" err="1" smtClean="0">
+                <a:ln>
+                  <a:noFill/>
+                </a:ln>
+                <a:solidFill>
+                  <a:srgbClr val="008000"/>
+                </a:solidFill>
+                <a:effectLst/>
+                <a:latin typeface="Courier New" panose="02070309020205020404" pitchFamily="49" charset="0"/>
+                <a:cs typeface="Courier New" panose="02070309020205020404" pitchFamily="49" charset="0"/>
+              </a:rPr>
+              <a:t>PagesController@uploadFinished</a:t>
+            </a:r>
+            <a:r>
+              <a:rPr kumimoji="0" lang="nl-NL" altLang="nl-NL" sz="1000" b="1" i="0" u="none" strike="noStrike" cap="none" normalizeH="0" baseline="0" dirty="0" smtClean="0">
+                <a:ln>
+                  <a:noFill/>
+                </a:ln>
+                <a:solidFill>
+                  <a:srgbClr val="008000"/>
+                </a:solidFill>
+                <a:effectLst/>
+                <a:latin typeface="Courier New" panose="02070309020205020404" pitchFamily="49" charset="0"/>
+                <a:cs typeface="Courier New" panose="02070309020205020404" pitchFamily="49" charset="0"/>
+              </a:rPr>
+              <a:t>'</a:t>
+            </a:r>
+            <a:r>
+              <a:rPr kumimoji="0" lang="nl-NL" altLang="nl-NL" sz="1000" b="0" i="0" u="none" strike="noStrike" cap="none" normalizeH="0" baseline="0" dirty="0" smtClean="0">
+                <a:ln>
+                  <a:noFill/>
+                </a:ln>
+                <a:solidFill>
+                  <a:srgbClr val="000000"/>
+                </a:solidFill>
+                <a:effectLst/>
+                <a:latin typeface="Courier New" panose="02070309020205020404" pitchFamily="49" charset="0"/>
+                <a:cs typeface="Courier New" panose="02070309020205020404" pitchFamily="49" charset="0"/>
+              </a:rPr>
+              <a:t>]);</a:t>
+            </a:r>
+            <a:endParaRPr kumimoji="0" lang="nl-NL" altLang="nl-NL" sz="1800" b="0" i="0" u="none" strike="noStrike" cap="none" normalizeH="0" baseline="0" dirty="0" smtClean="0">
+              <a:ln>
+                <a:noFill/>
+              </a:ln>
+              <a:solidFill>
+                <a:schemeClr val="tx1"/>
+              </a:solidFill>
+              <a:effectLst/>
+              <a:latin typeface="Arial" panose="020B0604020202020204" pitchFamily="34" charset="0"/>
+            </a:endParaRPr>
+          </a:p>
+        </p:txBody>
+      </p:sp>
+      <p:sp>
+        <p:nvSpPr>
+          <p:cNvPr id="6" name="Rectangle 3"/>
+          <p:cNvSpPr>
+            <a:spLocks noChangeArrowheads="1"/>
+          </p:cNvSpPr>
+          <p:nvPr/>
+        </p:nvSpPr>
+        <p:spPr bwMode="auto">
+          <a:xfrm>
+            <a:off x="0" y="5067837"/>
+            <a:ext cx="12192000" cy="457200"/>
+          </a:xfrm>
+          <a:prstGeom prst="rect">
+            <a:avLst/>
+          </a:prstGeom>
+          <a:solidFill>
+            <a:srgbClr val="FFFFFF"/>
+          </a:solidFill>
+          <a:ln>
+            <a:noFill/>
+          </a:ln>
+          <a:effectLst/>
+          <a:extLst>
+            <a:ext uri="{91240B29-F687-4F45-9708-019B960494DF}">
+              <a14:hiddenLine xmlns:a14="http://schemas.microsoft.com/office/drawing/2010/main" w="9525">
+                <a:solidFill>
+                  <a:schemeClr val="tx1"/>
+                </a:solidFill>
+                <a:miter lim="800000"/>
+                <a:headEnd/>
+                <a:tailEnd/>
+              </a14:hiddenLine>
+            </a:ext>
+            <a:ext uri="{AF507438-7753-43E0-B8FC-AC1667EBCBE1}">
+              <a14:hiddenEffects xmlns:a14="http://schemas.microsoft.com/office/drawing/2010/main">
+                <a:effectLst>
+                  <a:outerShdw dist="35921" dir="2700000" algn="ctr" rotWithShape="0">
+                    <a:schemeClr val="bg2"/>
+                  </a:outerShdw>
+                </a:effectLst>
+              </a14:hiddenEffects>
+            </a:ext>
+          </a:extLst>
+        </p:spPr>
+        <p:txBody>
+          <a:bodyPr vert="horz" wrap="none" lIns="91440" tIns="45720" rIns="91440" bIns="45720" numCol="1" anchor="ctr" anchorCtr="0" compatLnSpc="1">
+            <a:prstTxWarp prst="textNoShape">
+              <a:avLst/>
+            </a:prstTxWarp>
+            <a:spAutoFit/>
+          </a:bodyPr>
+          <a:lstStyle/>
+          <a:p>
+            <a:pPr marL="0" marR="0" lvl="0" indent="0" algn="l" defTabSz="914400" rtl="0" eaLnBrk="0" fontAlgn="base" latinLnBrk="0" hangingPunct="0">
+              <a:lnSpc>
+                <a:spcPct val="100000"/>
+              </a:lnSpc>
+              <a:spcBef>
+                <a:spcPct val="0"/>
+              </a:spcBef>
+              <a:spcAft>
+                <a:spcPct val="0"/>
+              </a:spcAft>
+              <a:buClrTx/>
+              <a:buSzTx/>
+              <a:buFontTx/>
+              <a:buNone/>
+              <a:tabLst/>
+            </a:pPr>
+            <a:r>
+              <a:rPr kumimoji="0" lang="nl-NL" altLang="nl-NL" sz="1000" b="0" i="0" u="none" strike="noStrike" cap="none" normalizeH="0" baseline="0" dirty="0" smtClean="0">
+                <a:ln>
+                  <a:noFill/>
+                </a:ln>
+                <a:solidFill>
+                  <a:srgbClr val="000000"/>
+                </a:solidFill>
+                <a:effectLst/>
+                <a:latin typeface="Courier New" panose="02070309020205020404" pitchFamily="49" charset="0"/>
+                <a:cs typeface="Courier New" panose="02070309020205020404" pitchFamily="49" charset="0"/>
+              </a:rPr>
+              <a:t>Route::get(</a:t>
+            </a:r>
+            <a:r>
+              <a:rPr kumimoji="0" lang="nl-NL" altLang="nl-NL" sz="1000" b="1" i="0" u="none" strike="noStrike" cap="none" normalizeH="0" baseline="0" dirty="0" smtClean="0">
+                <a:ln>
+                  <a:noFill/>
+                </a:ln>
+                <a:solidFill>
+                  <a:srgbClr val="008000"/>
+                </a:solidFill>
+                <a:effectLst/>
+                <a:latin typeface="Courier New" panose="02070309020205020404" pitchFamily="49" charset="0"/>
+                <a:cs typeface="Courier New" panose="02070309020205020404" pitchFamily="49" charset="0"/>
+              </a:rPr>
+              <a:t>'</a:t>
+            </a:r>
+            <a:r>
+              <a:rPr kumimoji="0" lang="nl-NL" altLang="nl-NL" sz="1000" b="1" i="0" u="none" strike="noStrike" cap="none" normalizeH="0" baseline="0" dirty="0" err="1" smtClean="0">
+                <a:ln>
+                  <a:noFill/>
+                </a:ln>
+                <a:solidFill>
+                  <a:srgbClr val="008000"/>
+                </a:solidFill>
+                <a:effectLst/>
+                <a:latin typeface="Courier New" panose="02070309020205020404" pitchFamily="49" charset="0"/>
+                <a:cs typeface="Courier New" panose="02070309020205020404" pitchFamily="49" charset="0"/>
+              </a:rPr>
+              <a:t>auth</a:t>
+            </a:r>
+            <a:r>
+              <a:rPr kumimoji="0" lang="nl-NL" altLang="nl-NL" sz="1000" b="1" i="0" u="none" strike="noStrike" cap="none" normalizeH="0" baseline="0" dirty="0" smtClean="0">
+                <a:ln>
+                  <a:noFill/>
+                </a:ln>
+                <a:solidFill>
+                  <a:srgbClr val="008000"/>
+                </a:solidFill>
+                <a:effectLst/>
+                <a:latin typeface="Courier New" panose="02070309020205020404" pitchFamily="49" charset="0"/>
+                <a:cs typeface="Courier New" panose="02070309020205020404" pitchFamily="49" charset="0"/>
+              </a:rPr>
+              <a:t>/login'</a:t>
+            </a:r>
+            <a:r>
+              <a:rPr kumimoji="0" lang="nl-NL" altLang="nl-NL" sz="1000" b="0" i="0" u="none" strike="noStrike" cap="none" normalizeH="0" baseline="0" dirty="0" smtClean="0">
+                <a:ln>
+                  <a:noFill/>
+                </a:ln>
+                <a:solidFill>
+                  <a:srgbClr val="000000"/>
+                </a:solidFill>
+                <a:effectLst/>
+                <a:latin typeface="Courier New" panose="02070309020205020404" pitchFamily="49" charset="0"/>
+                <a:cs typeface="Courier New" panose="02070309020205020404" pitchFamily="49" charset="0"/>
+              </a:rPr>
+              <a:t>, </a:t>
+            </a:r>
+            <a:r>
+              <a:rPr kumimoji="0" lang="nl-NL" altLang="nl-NL" sz="1000" b="1" i="0" u="none" strike="noStrike" cap="none" normalizeH="0" baseline="0" dirty="0" smtClean="0">
+                <a:ln>
+                  <a:noFill/>
+                </a:ln>
+                <a:solidFill>
+                  <a:srgbClr val="008000"/>
+                </a:solidFill>
+                <a:effectLst/>
+                <a:latin typeface="Courier New" panose="02070309020205020404" pitchFamily="49" charset="0"/>
+                <a:cs typeface="Courier New" panose="02070309020205020404" pitchFamily="49" charset="0"/>
+              </a:rPr>
+              <a:t>'</a:t>
+            </a:r>
+            <a:r>
+              <a:rPr kumimoji="0" lang="nl-NL" altLang="nl-NL" sz="1000" b="1" i="0" u="none" strike="noStrike" cap="none" normalizeH="0" baseline="0" dirty="0" err="1" smtClean="0">
+                <a:ln>
+                  <a:noFill/>
+                </a:ln>
+                <a:solidFill>
+                  <a:srgbClr val="008000"/>
+                </a:solidFill>
+                <a:effectLst/>
+                <a:latin typeface="Courier New" panose="02070309020205020404" pitchFamily="49" charset="0"/>
+                <a:cs typeface="Courier New" panose="02070309020205020404" pitchFamily="49" charset="0"/>
+              </a:rPr>
+              <a:t>Auth</a:t>
+            </a:r>
+            <a:r>
+              <a:rPr kumimoji="0" lang="nl-NL" altLang="nl-NL" sz="1000" b="1" i="0" u="none" strike="noStrike" cap="none" normalizeH="0" baseline="0" dirty="0" smtClean="0">
+                <a:ln>
+                  <a:noFill/>
+                </a:ln>
+                <a:solidFill>
+                  <a:srgbClr val="008000"/>
+                </a:solidFill>
+                <a:effectLst/>
+                <a:latin typeface="Courier New" panose="02070309020205020404" pitchFamily="49" charset="0"/>
+                <a:cs typeface="Courier New" panose="02070309020205020404" pitchFamily="49" charset="0"/>
+              </a:rPr>
+              <a:t>\</a:t>
+            </a:r>
+            <a:r>
+              <a:rPr kumimoji="0" lang="nl-NL" altLang="nl-NL" sz="1000" b="1" i="0" u="none" strike="noStrike" cap="none" normalizeH="0" baseline="0" dirty="0" err="1" smtClean="0">
+                <a:ln>
+                  <a:noFill/>
+                </a:ln>
+                <a:solidFill>
+                  <a:srgbClr val="008000"/>
+                </a:solidFill>
+                <a:effectLst/>
+                <a:latin typeface="Courier New" panose="02070309020205020404" pitchFamily="49" charset="0"/>
+                <a:cs typeface="Courier New" panose="02070309020205020404" pitchFamily="49" charset="0"/>
+              </a:rPr>
+              <a:t>AuthController@getLogin</a:t>
+            </a:r>
+            <a:r>
+              <a:rPr kumimoji="0" lang="nl-NL" altLang="nl-NL" sz="1000" b="1" i="0" u="none" strike="noStrike" cap="none" normalizeH="0" baseline="0" dirty="0" smtClean="0">
+                <a:ln>
+                  <a:noFill/>
+                </a:ln>
+                <a:solidFill>
+                  <a:srgbClr val="008000"/>
+                </a:solidFill>
+                <a:effectLst/>
+                <a:latin typeface="Courier New" panose="02070309020205020404" pitchFamily="49" charset="0"/>
+                <a:cs typeface="Courier New" panose="02070309020205020404" pitchFamily="49" charset="0"/>
+              </a:rPr>
+              <a:t>'</a:t>
+            </a:r>
+            <a:r>
+              <a:rPr kumimoji="0" lang="nl-NL" altLang="nl-NL" sz="1000" b="0" i="0" u="none" strike="noStrike" cap="none" normalizeH="0" baseline="0" dirty="0" smtClean="0">
+                <a:ln>
+                  <a:noFill/>
+                </a:ln>
+                <a:solidFill>
+                  <a:srgbClr val="000000"/>
+                </a:solidFill>
+                <a:effectLst/>
+                <a:latin typeface="Courier New" panose="02070309020205020404" pitchFamily="49" charset="0"/>
+                <a:cs typeface="Courier New" panose="02070309020205020404" pitchFamily="49" charset="0"/>
+              </a:rPr>
+              <a:t>);</a:t>
+            </a:r>
+            <a:endParaRPr kumimoji="0" lang="nl-NL" altLang="nl-NL" sz="1800" b="0" i="0" u="none" strike="noStrike" cap="none" normalizeH="0" baseline="0" dirty="0" smtClean="0">
+              <a:ln>
+                <a:noFill/>
+              </a:ln>
+              <a:solidFill>
+                <a:schemeClr val="tx1"/>
+              </a:solidFill>
+              <a:effectLst/>
+              <a:latin typeface="Arial" panose="020B0604020202020204" pitchFamily="34" charset="0"/>
+            </a:endParaRPr>
+          </a:p>
+        </p:txBody>
+      </p:sp>
+      <p:sp>
+        <p:nvSpPr>
+          <p:cNvPr id="7" name="Rectangle 4"/>
+          <p:cNvSpPr>
+            <a:spLocks noChangeArrowheads="1"/>
+          </p:cNvSpPr>
+          <p:nvPr/>
+        </p:nvSpPr>
+        <p:spPr bwMode="auto">
+          <a:xfrm>
+            <a:off x="0" y="5525037"/>
+            <a:ext cx="12192000" cy="457200"/>
+          </a:xfrm>
+          <a:prstGeom prst="rect">
+            <a:avLst/>
+          </a:prstGeom>
+          <a:solidFill>
+            <a:srgbClr val="FFFFFF"/>
+          </a:solidFill>
+          <a:ln>
+            <a:noFill/>
+          </a:ln>
+          <a:effectLst/>
+          <a:extLst>
+            <a:ext uri="{91240B29-F687-4F45-9708-019B960494DF}">
+              <a14:hiddenLine xmlns:a14="http://schemas.microsoft.com/office/drawing/2010/main" w="9525">
+                <a:solidFill>
+                  <a:schemeClr val="tx1"/>
+                </a:solidFill>
+                <a:miter lim="800000"/>
+                <a:headEnd/>
+                <a:tailEnd/>
+              </a14:hiddenLine>
+            </a:ext>
+            <a:ext uri="{AF507438-7753-43E0-B8FC-AC1667EBCBE1}">
+              <a14:hiddenEffects xmlns:a14="http://schemas.microsoft.com/office/drawing/2010/main">
+                <a:effectLst>
+                  <a:outerShdw dist="35921" dir="2700000" algn="ctr" rotWithShape="0">
+                    <a:schemeClr val="bg2"/>
+                  </a:outerShdw>
+                </a:effectLst>
+              </a14:hiddenEffects>
+            </a:ext>
+          </a:extLst>
+        </p:spPr>
+        <p:txBody>
+          <a:bodyPr vert="horz" wrap="none" lIns="91440" tIns="45720" rIns="91440" bIns="45720" numCol="1" anchor="ctr" anchorCtr="0" compatLnSpc="1">
+            <a:prstTxWarp prst="textNoShape">
+              <a:avLst/>
+            </a:prstTxWarp>
+            <a:spAutoFit/>
+          </a:bodyPr>
+          <a:lstStyle/>
+          <a:p>
+            <a:pPr marL="0" marR="0" lvl="0" indent="0" algn="l" defTabSz="914400" rtl="0" eaLnBrk="0" fontAlgn="base" latinLnBrk="0" hangingPunct="0">
+              <a:lnSpc>
+                <a:spcPct val="100000"/>
+              </a:lnSpc>
+              <a:spcBef>
+                <a:spcPct val="0"/>
+              </a:spcBef>
+              <a:spcAft>
+                <a:spcPct val="0"/>
+              </a:spcAft>
+              <a:buClrTx/>
+              <a:buSzTx/>
+              <a:buFontTx/>
+              <a:buNone/>
+              <a:tabLst/>
+            </a:pPr>
+            <a:r>
+              <a:rPr kumimoji="0" lang="nl-NL" altLang="nl-NL" sz="1000" b="0" i="0" u="none" strike="noStrike" cap="none" normalizeH="0" baseline="0" dirty="0" smtClean="0">
+                <a:ln>
+                  <a:noFill/>
+                </a:ln>
+                <a:solidFill>
+                  <a:srgbClr val="000000"/>
+                </a:solidFill>
+                <a:effectLst/>
+                <a:latin typeface="Courier New" panose="02070309020205020404" pitchFamily="49" charset="0"/>
+                <a:cs typeface="Courier New" panose="02070309020205020404" pitchFamily="49" charset="0"/>
+              </a:rPr>
+              <a:t>Route::post(</a:t>
+            </a:r>
+            <a:r>
+              <a:rPr kumimoji="0" lang="nl-NL" altLang="nl-NL" sz="1000" b="1" i="0" u="none" strike="noStrike" cap="none" normalizeH="0" baseline="0" dirty="0" smtClean="0">
+                <a:ln>
+                  <a:noFill/>
+                </a:ln>
+                <a:solidFill>
+                  <a:srgbClr val="008000"/>
+                </a:solidFill>
+                <a:effectLst/>
+                <a:latin typeface="Courier New" panose="02070309020205020404" pitchFamily="49" charset="0"/>
+                <a:cs typeface="Courier New" panose="02070309020205020404" pitchFamily="49" charset="0"/>
+              </a:rPr>
+              <a:t>'</a:t>
+            </a:r>
+            <a:r>
+              <a:rPr kumimoji="0" lang="nl-NL" altLang="nl-NL" sz="1000" b="1" i="0" u="none" strike="noStrike" cap="none" normalizeH="0" baseline="0" dirty="0" err="1" smtClean="0">
+                <a:ln>
+                  <a:noFill/>
+                </a:ln>
+                <a:solidFill>
+                  <a:srgbClr val="008000"/>
+                </a:solidFill>
+                <a:effectLst/>
+                <a:latin typeface="Courier New" panose="02070309020205020404" pitchFamily="49" charset="0"/>
+                <a:cs typeface="Courier New" panose="02070309020205020404" pitchFamily="49" charset="0"/>
+              </a:rPr>
+              <a:t>auth</a:t>
+            </a:r>
+            <a:r>
+              <a:rPr kumimoji="0" lang="nl-NL" altLang="nl-NL" sz="1000" b="1" i="0" u="none" strike="noStrike" cap="none" normalizeH="0" baseline="0" dirty="0" smtClean="0">
+                <a:ln>
+                  <a:noFill/>
+                </a:ln>
+                <a:solidFill>
+                  <a:srgbClr val="008000"/>
+                </a:solidFill>
+                <a:effectLst/>
+                <a:latin typeface="Courier New" panose="02070309020205020404" pitchFamily="49" charset="0"/>
+                <a:cs typeface="Courier New" panose="02070309020205020404" pitchFamily="49" charset="0"/>
+              </a:rPr>
+              <a:t>/login'</a:t>
+            </a:r>
+            <a:r>
+              <a:rPr kumimoji="0" lang="nl-NL" altLang="nl-NL" sz="1000" b="0" i="0" u="none" strike="noStrike" cap="none" normalizeH="0" baseline="0" dirty="0" smtClean="0">
+                <a:ln>
+                  <a:noFill/>
+                </a:ln>
+                <a:solidFill>
+                  <a:srgbClr val="000000"/>
+                </a:solidFill>
+                <a:effectLst/>
+                <a:latin typeface="Courier New" panose="02070309020205020404" pitchFamily="49" charset="0"/>
+                <a:cs typeface="Courier New" panose="02070309020205020404" pitchFamily="49" charset="0"/>
+              </a:rPr>
+              <a:t>, </a:t>
+            </a:r>
+            <a:r>
+              <a:rPr kumimoji="0" lang="nl-NL" altLang="nl-NL" sz="1000" b="1" i="0" u="none" strike="noStrike" cap="none" normalizeH="0" baseline="0" dirty="0" smtClean="0">
+                <a:ln>
+                  <a:noFill/>
+                </a:ln>
+                <a:solidFill>
+                  <a:srgbClr val="008000"/>
+                </a:solidFill>
+                <a:effectLst/>
+                <a:latin typeface="Courier New" panose="02070309020205020404" pitchFamily="49" charset="0"/>
+                <a:cs typeface="Courier New" panose="02070309020205020404" pitchFamily="49" charset="0"/>
+              </a:rPr>
+              <a:t>'</a:t>
+            </a:r>
+            <a:r>
+              <a:rPr kumimoji="0" lang="nl-NL" altLang="nl-NL" sz="1000" b="1" i="0" u="none" strike="noStrike" cap="none" normalizeH="0" baseline="0" dirty="0" err="1" smtClean="0">
+                <a:ln>
+                  <a:noFill/>
+                </a:ln>
+                <a:solidFill>
+                  <a:srgbClr val="008000"/>
+                </a:solidFill>
+                <a:effectLst/>
+                <a:latin typeface="Courier New" panose="02070309020205020404" pitchFamily="49" charset="0"/>
+                <a:cs typeface="Courier New" panose="02070309020205020404" pitchFamily="49" charset="0"/>
+              </a:rPr>
+              <a:t>Auth</a:t>
+            </a:r>
+            <a:r>
+              <a:rPr kumimoji="0" lang="nl-NL" altLang="nl-NL" sz="1000" b="1" i="0" u="none" strike="noStrike" cap="none" normalizeH="0" baseline="0" dirty="0" smtClean="0">
+                <a:ln>
+                  <a:noFill/>
+                </a:ln>
+                <a:solidFill>
+                  <a:srgbClr val="008000"/>
+                </a:solidFill>
+                <a:effectLst/>
+                <a:latin typeface="Courier New" panose="02070309020205020404" pitchFamily="49" charset="0"/>
+                <a:cs typeface="Courier New" panose="02070309020205020404" pitchFamily="49" charset="0"/>
+              </a:rPr>
+              <a:t>\</a:t>
+            </a:r>
+            <a:r>
+              <a:rPr kumimoji="0" lang="nl-NL" altLang="nl-NL" sz="1000" b="1" i="0" u="none" strike="noStrike" cap="none" normalizeH="0" baseline="0" dirty="0" err="1" smtClean="0">
+                <a:ln>
+                  <a:noFill/>
+                </a:ln>
+                <a:solidFill>
+                  <a:srgbClr val="008000"/>
+                </a:solidFill>
+                <a:effectLst/>
+                <a:latin typeface="Courier New" panose="02070309020205020404" pitchFamily="49" charset="0"/>
+                <a:cs typeface="Courier New" panose="02070309020205020404" pitchFamily="49" charset="0"/>
+              </a:rPr>
+              <a:t>AuthController@postLogin</a:t>
+            </a:r>
+            <a:r>
+              <a:rPr kumimoji="0" lang="nl-NL" altLang="nl-NL" sz="1000" b="1" i="0" u="none" strike="noStrike" cap="none" normalizeH="0" baseline="0" dirty="0" smtClean="0">
+                <a:ln>
+                  <a:noFill/>
+                </a:ln>
+                <a:solidFill>
+                  <a:srgbClr val="008000"/>
+                </a:solidFill>
+                <a:effectLst/>
+                <a:latin typeface="Courier New" panose="02070309020205020404" pitchFamily="49" charset="0"/>
+                <a:cs typeface="Courier New" panose="02070309020205020404" pitchFamily="49" charset="0"/>
+              </a:rPr>
+              <a:t>'</a:t>
+            </a:r>
+            <a:r>
+              <a:rPr kumimoji="0" lang="nl-NL" altLang="nl-NL" sz="1000" b="0" i="0" u="none" strike="noStrike" cap="none" normalizeH="0" baseline="0" dirty="0" smtClean="0">
+                <a:ln>
+                  <a:noFill/>
+                </a:ln>
+                <a:solidFill>
+                  <a:srgbClr val="000000"/>
+                </a:solidFill>
+                <a:effectLst/>
+                <a:latin typeface="Courier New" panose="02070309020205020404" pitchFamily="49" charset="0"/>
+                <a:cs typeface="Courier New" panose="02070309020205020404" pitchFamily="49" charset="0"/>
+              </a:rPr>
+              <a:t>);</a:t>
+            </a:r>
+            <a:endParaRPr kumimoji="0" lang="nl-NL" altLang="nl-NL" sz="1800" b="0" i="0" u="none" strike="noStrike" cap="none" normalizeH="0" baseline="0" dirty="0" smtClean="0">
+              <a:ln>
+                <a:noFill/>
+              </a:ln>
+              <a:solidFill>
+                <a:schemeClr val="tx1"/>
+              </a:solidFill>
+              <a:effectLst/>
+              <a:latin typeface="Arial" panose="020B0604020202020204" pitchFamily="34" charset="0"/>
+            </a:endParaRPr>
           </a:p>
         </p:txBody>
       </p:sp>
@@ -9956,6 +10956,13 @@
   <p:clrMapOvr>
     <a:masterClrMapping/>
   </p:clrMapOvr>
+  <p:timing>
+    <p:tnLst>
+      <p:par>
+        <p:cTn id="1" dur="indefinite" restart="never" nodeType="tmRoot"/>
+      </p:par>
+    </p:tnLst>
+  </p:timing>
 </p:sld>
 </file>
 
@@ -10064,6 +11071,29 @@
           </a:p>
         </p:txBody>
       </p:sp>
+      <p:pic>
+        <p:nvPicPr>
+          <p:cNvPr id="4" name="Afbeelding 3"/>
+          <p:cNvPicPr>
+            <a:picLocks noChangeAspect="1"/>
+          </p:cNvPicPr>
+          <p:nvPr/>
+        </p:nvPicPr>
+        <p:blipFill rotWithShape="1">
+          <a:blip r:embed="rId3"/>
+          <a:srcRect l="9875" t="19555" r="38087" b="41868"/>
+          <a:stretch/>
+        </p:blipFill>
+        <p:spPr>
+          <a:xfrm>
+            <a:off x="5684932" y="3959215"/>
+            <a:ext cx="6189512" cy="2579698"/>
+          </a:xfrm>
+          <a:prstGeom prst="rect">
+            <a:avLst/>
+          </a:prstGeom>
+        </p:spPr>
+      </p:pic>
     </p:spTree>
     <p:extLst>
       <p:ext uri="{BB962C8B-B14F-4D97-AF65-F5344CB8AC3E}">
@@ -10074,6 +11104,13 @@
   <p:clrMapOvr>
     <a:masterClrMapping/>
   </p:clrMapOvr>
+  <p:timing>
+    <p:tnLst>
+      <p:par>
+        <p:cTn id="1" dur="indefinite" restart="never" nodeType="tmRoot"/>
+      </p:par>
+    </p:tnLst>
+  </p:timing>
 </p:sld>
 </file>
 
@@ -10104,6 +11141,147 @@
             <p:ph type="title"/>
           </p:nvPr>
         </p:nvSpPr>
+        <p:spPr/>
+        <p:txBody>
+          <a:bodyPr/>
+          <a:lstStyle/>
+          <a:p>
+            <a:r>
+              <a:rPr lang="nl-NL" dirty="0" err="1" smtClean="0"/>
+              <a:t>Interested</a:t>
+            </a:r>
+            <a:r>
+              <a:rPr lang="nl-NL" dirty="0" smtClean="0"/>
+              <a:t>?</a:t>
+            </a:r>
+            <a:endParaRPr lang="nl-NL" dirty="0"/>
+          </a:p>
+        </p:txBody>
+      </p:sp>
+      <p:sp>
+        <p:nvSpPr>
+          <p:cNvPr id="3" name="Tijdelijke aanduiding voor inhoud 2"/>
+          <p:cNvSpPr>
+            <a:spLocks noGrp="1"/>
+          </p:cNvSpPr>
+          <p:nvPr>
+            <p:ph idx="1"/>
+          </p:nvPr>
+        </p:nvSpPr>
+        <p:spPr/>
+        <p:txBody>
+          <a:bodyPr/>
+          <a:lstStyle/>
+          <a:p>
+            <a:r>
+              <a:rPr lang="nl-NL" dirty="0" err="1" smtClean="0"/>
+              <a:t>Laracon</a:t>
+            </a:r>
+            <a:endParaRPr lang="nl-NL" dirty="0" smtClean="0"/>
+          </a:p>
+          <a:p>
+            <a:r>
+              <a:rPr lang="nl-NL" dirty="0" smtClean="0"/>
+              <a:t>Amsterdam</a:t>
+            </a:r>
+          </a:p>
+          <a:p>
+            <a:r>
+              <a:rPr lang="nl-NL" dirty="0" smtClean="0"/>
+              <a:t>23th &amp; 24th August</a:t>
+            </a:r>
+            <a:endParaRPr lang="nl-NL" dirty="0"/>
+          </a:p>
+        </p:txBody>
+      </p:sp>
+      <p:pic>
+        <p:nvPicPr>
+          <p:cNvPr id="3076" name="Picture 4" descr="https://pbs.twimg.com/media/CYGoVCaWcAAqwlv.jpg"/>
+          <p:cNvPicPr>
+            <a:picLocks noChangeAspect="1" noChangeArrowheads="1"/>
+          </p:cNvPicPr>
+          <p:nvPr/>
+        </p:nvPicPr>
+        <p:blipFill>
+          <a:blip r:embed="rId2">
+            <a:extLst>
+              <a:ext uri="{28A0092B-C50C-407E-A947-70E740481C1C}">
+                <a14:useLocalDpi xmlns:a14="http://schemas.microsoft.com/office/drawing/2010/main" val="0"/>
+              </a:ext>
+            </a:extLst>
+          </a:blip>
+          <a:srcRect/>
+          <a:stretch>
+            <a:fillRect/>
+          </a:stretch>
+        </p:blipFill>
+        <p:spPr bwMode="auto">
+          <a:xfrm>
+            <a:off x="1297577" y="4005330"/>
+            <a:ext cx="8558010" cy="2852670"/>
+          </a:xfrm>
+          <a:prstGeom prst="rect">
+            <a:avLst/>
+          </a:prstGeom>
+          <a:noFill/>
+          <a:extLst>
+            <a:ext uri="{909E8E84-426E-40DD-AFC4-6F175D3DCCD1}">
+              <a14:hiddenFill xmlns:a14="http://schemas.microsoft.com/office/drawing/2010/main">
+                <a:solidFill>
+                  <a:srgbClr val="FFFFFF"/>
+                </a:solidFill>
+              </a14:hiddenFill>
+            </a:ext>
+          </a:extLst>
+        </p:spPr>
+      </p:pic>
+    </p:spTree>
+    <p:extLst>
+      <p:ext uri="{BB962C8B-B14F-4D97-AF65-F5344CB8AC3E}">
+        <p14:creationId xmlns:p14="http://schemas.microsoft.com/office/powerpoint/2010/main" val="2200886844"/>
+      </p:ext>
+    </p:extLst>
+  </p:cSld>
+  <p:clrMapOvr>
+    <a:masterClrMapping/>
+  </p:clrMapOvr>
+  <p:timing>
+    <p:tnLst>
+      <p:par>
+        <p:cTn id="1" dur="indefinite" restart="never" nodeType="tmRoot"/>
+      </p:par>
+    </p:tnLst>
+  </p:timing>
+</p:sld>
+</file>
+
+<file path=ppt/slides/slide23.xml><?xml version="1.0" encoding="utf-8"?>
+<p:sld xmlns:a="http://schemas.openxmlformats.org/drawingml/2006/main" xmlns:r="http://schemas.openxmlformats.org/officeDocument/2006/relationships" xmlns:p="http://schemas.openxmlformats.org/presentationml/2006/main">
+  <p:cSld>
+    <p:spTree>
+      <p:nvGrpSpPr>
+        <p:cNvPr id="1" name=""/>
+        <p:cNvGrpSpPr/>
+        <p:nvPr/>
+      </p:nvGrpSpPr>
+      <p:grpSpPr>
+        <a:xfrm>
+          <a:off x="0" y="0"/>
+          <a:ext cx="0" cy="0"/>
+          <a:chOff x="0" y="0"/>
+          <a:chExt cx="0" cy="0"/>
+        </a:xfrm>
+      </p:grpSpPr>
+      <p:sp>
+        <p:nvSpPr>
+          <p:cNvPr id="2" name="Titel 1"/>
+          <p:cNvSpPr>
+            <a:spLocks noGrp="1"/>
+          </p:cNvSpPr>
+          <p:nvPr>
+            <p:ph type="title"/>
+          </p:nvPr>
+        </p:nvSpPr>
         <p:spPr>
           <a:xfrm>
             <a:off x="28007" y="1817688"/>
@@ -10168,10 +11346,17 @@
   <p:clrMapOvr>
     <a:masterClrMapping/>
   </p:clrMapOvr>
+  <p:timing>
+    <p:tnLst>
+      <p:par>
+        <p:cTn id="1" dur="indefinite" restart="never" nodeType="tmRoot"/>
+      </p:par>
+    </p:tnLst>
+  </p:timing>
 </p:sld>
 </file>
 
-<file path=ppt/slides/slide23.xml><?xml version="1.0" encoding="utf-8"?>
+<file path=ppt/slides/slide24.xml><?xml version="1.0" encoding="utf-8"?>
 <p:sld xmlns:a="http://schemas.openxmlformats.org/drawingml/2006/main" xmlns:r="http://schemas.openxmlformats.org/officeDocument/2006/relationships" xmlns:p="http://schemas.openxmlformats.org/presentationml/2006/main">
   <p:cSld>
     <p:spTree>

</xml_diff>